<commit_message>
Add link to slides
</commit_message>
<xml_diff>
--- a/Python and Machine Learning - Session 1.pptx
+++ b/Python and Machine Learning - Session 1.pptx
@@ -163,6 +163,43 @@
     </p:ext>
   </p:extLst>
 </p:presentation>
+</file>
+
+<file path=ppt/revisionInfo.xml><?xml version="1.0" encoding="utf-8"?>
+<p1510:revInfo xmlns:a="http://schemas.openxmlformats.org/drawingml/2006/main" xmlns:r="http://schemas.openxmlformats.org/officeDocument/2006/relationships" xmlns:p1510="http://schemas.microsoft.com/office/powerpoint/2015/10/main">
+  <p1510:revLst>
+    <p1510:client id="{D371F446-BFBA-435D-AA5B-6E16AB7991C8}" v="1" dt="2025-03-17T19:39:47.016"/>
+  </p1510:revLst>
+</p1510:revInfo>
+</file>
+
+<file path=ppt/changesInfos/changesInfo1.xml><?xml version="1.0" encoding="utf-8"?>
+<pc:chgInfo xmlns:a="http://schemas.openxmlformats.org/drawingml/2006/main" xmlns:r="http://schemas.openxmlformats.org/officeDocument/2006/relationships" xmlns:ac="http://schemas.microsoft.com/office/drawing/2013/main/command" xmlns:pc="http://schemas.microsoft.com/office/powerpoint/2013/main/command">
+  <pc:docChgLst>
+    <pc:chgData name="Cosmo De Bonis-Campbell" userId="0e643c3f-1c6d-4563-b088-b166cc6858a2" providerId="ADAL" clId="{D371F446-BFBA-435D-AA5B-6E16AB7991C8}"/>
+    <pc:docChg chg="modSld">
+      <pc:chgData name="Cosmo De Bonis-Campbell" userId="0e643c3f-1c6d-4563-b088-b166cc6858a2" providerId="ADAL" clId="{D371F446-BFBA-435D-AA5B-6E16AB7991C8}" dt="2025-03-17T19:39:47.016" v="0"/>
+      <pc:docMkLst>
+        <pc:docMk/>
+      </pc:docMkLst>
+      <pc:sldChg chg="addSp modSp">
+        <pc:chgData name="Cosmo De Bonis-Campbell" userId="0e643c3f-1c6d-4563-b088-b166cc6858a2" providerId="ADAL" clId="{D371F446-BFBA-435D-AA5B-6E16AB7991C8}" dt="2025-03-17T19:39:47.016" v="0"/>
+        <pc:sldMkLst>
+          <pc:docMk/>
+          <pc:sldMk cId="2592137955" sldId="313"/>
+        </pc:sldMkLst>
+        <pc:spChg chg="add mod">
+          <ac:chgData name="Cosmo De Bonis-Campbell" userId="0e643c3f-1c6d-4563-b088-b166cc6858a2" providerId="ADAL" clId="{D371F446-BFBA-435D-AA5B-6E16AB7991C8}" dt="2025-03-17T19:39:47.016" v="0"/>
+          <ac:spMkLst>
+            <pc:docMk/>
+            <pc:sldMk cId="2592137955" sldId="313"/>
+            <ac:spMk id="4" creationId="{CE7C585B-07CD-A488-9F2E-F45821F4FBDC}"/>
+          </ac:spMkLst>
+        </pc:spChg>
+      </pc:sldChg>
+    </pc:docChg>
+  </pc:docChgLst>
+</pc:chgInfo>
 </file>
 
 <file path=ppt/handoutMasters/handoutMaster1.xml><?xml version="1.0" encoding="utf-8"?>
@@ -7089,13 +7126,13 @@
   <p:clrMapOvr>
     <a:masterClrMapping/>
   </p:clrMapOvr>
-  <mc:AlternateContent xmlns:mc="http://schemas.openxmlformats.org/markup-compatibility/2006">
-    <mc:Choice xmlns:p14="http://schemas.microsoft.com/office/powerpoint/2010/main" Requires="p14">
+  <mc:AlternateContent xmlns:mc="http://schemas.openxmlformats.org/markup-compatibility/2006" xmlns:p14="http://schemas.microsoft.com/office/powerpoint/2010/main">
+    <mc:Choice Requires="p14">
       <p:transition spd="med" p14:dur="700">
         <p:fade/>
       </p:transition>
     </mc:Choice>
-    <mc:Fallback>
+    <mc:Fallback xmlns="">
       <p:transition spd="med">
         <p:fade/>
       </p:transition>
@@ -7286,13 +7323,13 @@
   <p:clrMapOvr>
     <a:masterClrMapping/>
   </p:clrMapOvr>
-  <mc:AlternateContent xmlns:mc="http://schemas.openxmlformats.org/markup-compatibility/2006">
-    <mc:Choice xmlns:p14="http://schemas.microsoft.com/office/powerpoint/2010/main" Requires="p14">
+  <mc:AlternateContent xmlns:mc="http://schemas.openxmlformats.org/markup-compatibility/2006" xmlns:p14="http://schemas.microsoft.com/office/powerpoint/2010/main">
+    <mc:Choice Requires="p14">
       <p:transition spd="med" p14:dur="700">
         <p:fade/>
       </p:transition>
     </mc:Choice>
-    <mc:Fallback>
+    <mc:Fallback xmlns="">
       <p:transition spd="med">
         <p:fade/>
       </p:transition>
@@ -7789,13 +7826,13 @@
   <p:clrMapOvr>
     <a:masterClrMapping/>
   </p:clrMapOvr>
-  <mc:AlternateContent xmlns:mc="http://schemas.openxmlformats.org/markup-compatibility/2006">
-    <mc:Choice xmlns:p14="http://schemas.microsoft.com/office/powerpoint/2010/main" Requires="p14">
+  <mc:AlternateContent xmlns:mc="http://schemas.openxmlformats.org/markup-compatibility/2006" xmlns:p14="http://schemas.microsoft.com/office/powerpoint/2010/main">
+    <mc:Choice Requires="p14">
       <p:transition spd="med" p14:dur="700">
         <p:fade/>
       </p:transition>
     </mc:Choice>
-    <mc:Fallback>
+    <mc:Fallback xmlns="">
       <p:transition spd="med">
         <p:fade/>
       </p:transition>
@@ -8262,13 +8299,13 @@
   <p:clrMapOvr>
     <a:masterClrMapping/>
   </p:clrMapOvr>
-  <mc:AlternateContent xmlns:mc="http://schemas.openxmlformats.org/markup-compatibility/2006">
-    <mc:Choice xmlns:p14="http://schemas.microsoft.com/office/powerpoint/2010/main" Requires="p14">
+  <mc:AlternateContent xmlns:mc="http://schemas.openxmlformats.org/markup-compatibility/2006" xmlns:p14="http://schemas.microsoft.com/office/powerpoint/2010/main">
+    <mc:Choice Requires="p14">
       <p:transition spd="med" p14:dur="700">
         <p:fade/>
       </p:transition>
     </mc:Choice>
-    <mc:Fallback>
+    <mc:Fallback xmlns="">
       <p:transition spd="med">
         <p:fade/>
       </p:transition>
@@ -9688,13 +9725,13 @@
   <p:clrMapOvr>
     <a:masterClrMapping/>
   </p:clrMapOvr>
-  <mc:AlternateContent xmlns:mc="http://schemas.openxmlformats.org/markup-compatibility/2006">
-    <mc:Choice xmlns:p14="http://schemas.microsoft.com/office/powerpoint/2010/main" Requires="p14">
+  <mc:AlternateContent xmlns:mc="http://schemas.openxmlformats.org/markup-compatibility/2006" xmlns:p14="http://schemas.microsoft.com/office/powerpoint/2010/main">
+    <mc:Choice Requires="p14">
       <p:transition spd="med" p14:dur="700">
         <p:fade/>
       </p:transition>
     </mc:Choice>
-    <mc:Fallback>
+    <mc:Fallback xmlns="">
       <p:transition spd="med">
         <p:fade/>
       </p:transition>
@@ -10568,13 +10605,13 @@
   <p:clrMapOvr>
     <a:masterClrMapping/>
   </p:clrMapOvr>
-  <mc:AlternateContent xmlns:mc="http://schemas.openxmlformats.org/markup-compatibility/2006">
-    <mc:Choice xmlns:p14="http://schemas.microsoft.com/office/powerpoint/2010/main" Requires="p14">
+  <mc:AlternateContent xmlns:mc="http://schemas.openxmlformats.org/markup-compatibility/2006" xmlns:p14="http://schemas.microsoft.com/office/powerpoint/2010/main">
+    <mc:Choice Requires="p14">
       <p:transition spd="med" p14:dur="700">
         <p:fade/>
       </p:transition>
     </mc:Choice>
-    <mc:Fallback>
+    <mc:Fallback xmlns="">
       <p:transition spd="med">
         <p:fade/>
       </p:transition>
@@ -10742,13 +10779,13 @@
   <p:clrMapOvr>
     <a:masterClrMapping/>
   </p:clrMapOvr>
-  <mc:AlternateContent xmlns:mc="http://schemas.openxmlformats.org/markup-compatibility/2006">
-    <mc:Choice xmlns:p14="http://schemas.microsoft.com/office/powerpoint/2010/main" Requires="p14">
+  <mc:AlternateContent xmlns:mc="http://schemas.openxmlformats.org/markup-compatibility/2006" xmlns:p14="http://schemas.microsoft.com/office/powerpoint/2010/main">
+    <mc:Choice Requires="p14">
       <p:transition spd="med" p14:dur="700">
         <p:fade/>
       </p:transition>
     </mc:Choice>
-    <mc:Fallback>
+    <mc:Fallback xmlns="">
       <p:transition spd="med">
         <p:fade/>
       </p:transition>
@@ -10897,13 +10934,13 @@
   <p:clrMapOvr>
     <a:masterClrMapping/>
   </p:clrMapOvr>
-  <mc:AlternateContent xmlns:mc="http://schemas.openxmlformats.org/markup-compatibility/2006">
-    <mc:Choice xmlns:p14="http://schemas.microsoft.com/office/powerpoint/2010/main" Requires="p14">
+  <mc:AlternateContent xmlns:mc="http://schemas.openxmlformats.org/markup-compatibility/2006" xmlns:p14="http://schemas.microsoft.com/office/powerpoint/2010/main">
+    <mc:Choice Requires="p14">
       <p:transition spd="med" p14:dur="700">
         <p:fade/>
       </p:transition>
     </mc:Choice>
-    <mc:Fallback>
+    <mc:Fallback xmlns="">
       <p:transition spd="med">
         <p:fade/>
       </p:transition>
@@ -11032,13 +11069,13 @@
   <p:clrMapOvr>
     <a:masterClrMapping/>
   </p:clrMapOvr>
-  <mc:AlternateContent xmlns:mc="http://schemas.openxmlformats.org/markup-compatibility/2006">
-    <mc:Choice xmlns:p14="http://schemas.microsoft.com/office/powerpoint/2010/main" Requires="p14">
+  <mc:AlternateContent xmlns:mc="http://schemas.openxmlformats.org/markup-compatibility/2006" xmlns:p14="http://schemas.microsoft.com/office/powerpoint/2010/main">
+    <mc:Choice Requires="p14">
       <p:transition spd="med" p14:dur="700">
         <p:fade/>
       </p:transition>
     </mc:Choice>
-    <mc:Fallback>
+    <mc:Fallback xmlns="">
       <p:transition spd="med">
         <p:fade/>
       </p:transition>
@@ -11159,13 +11196,13 @@
   <p:clrMapOvr>
     <a:masterClrMapping/>
   </p:clrMapOvr>
-  <mc:AlternateContent xmlns:mc="http://schemas.openxmlformats.org/markup-compatibility/2006">
-    <mc:Choice xmlns:p14="http://schemas.microsoft.com/office/powerpoint/2010/main" Requires="p14">
+  <mc:AlternateContent xmlns:mc="http://schemas.openxmlformats.org/markup-compatibility/2006" xmlns:p14="http://schemas.microsoft.com/office/powerpoint/2010/main">
+    <mc:Choice Requires="p14">
       <p:transition spd="med" p14:dur="700">
         <p:fade/>
       </p:transition>
     </mc:Choice>
-    <mc:Fallback>
+    <mc:Fallback xmlns="">
       <p:transition spd="med">
         <p:fade/>
       </p:transition>
@@ -11557,13 +11594,13 @@
   <p:clrMapOvr>
     <a:masterClrMapping/>
   </p:clrMapOvr>
-  <mc:AlternateContent xmlns:mc="http://schemas.openxmlformats.org/markup-compatibility/2006">
-    <mc:Choice xmlns:p14="http://schemas.microsoft.com/office/powerpoint/2010/main" Requires="p14">
+  <mc:AlternateContent xmlns:mc="http://schemas.openxmlformats.org/markup-compatibility/2006" xmlns:p14="http://schemas.microsoft.com/office/powerpoint/2010/main">
+    <mc:Choice Requires="p14">
       <p:transition spd="med" p14:dur="700">
         <p:fade/>
       </p:transition>
     </mc:Choice>
-    <mc:Fallback>
+    <mc:Fallback xmlns="">
       <p:transition spd="med">
         <p:fade/>
       </p:transition>
@@ -11718,13 +11755,13 @@
   <p:clrMapOvr>
     <a:masterClrMapping/>
   </p:clrMapOvr>
-  <mc:AlternateContent xmlns:mc="http://schemas.openxmlformats.org/markup-compatibility/2006">
-    <mc:Choice xmlns:p14="http://schemas.microsoft.com/office/powerpoint/2010/main" Requires="p14">
+  <mc:AlternateContent xmlns:mc="http://schemas.openxmlformats.org/markup-compatibility/2006" xmlns:p14="http://schemas.microsoft.com/office/powerpoint/2010/main">
+    <mc:Choice Requires="p14">
       <p:transition spd="med" p14:dur="700">
         <p:fade/>
       </p:transition>
     </mc:Choice>
-    <mc:Fallback>
+    <mc:Fallback xmlns="">
       <p:transition spd="med">
         <p:fade/>
       </p:transition>
@@ -11882,13 +11919,13 @@
   <p:clrMapOvr>
     <a:masterClrMapping/>
   </p:clrMapOvr>
-  <mc:AlternateContent xmlns:mc="http://schemas.openxmlformats.org/markup-compatibility/2006">
-    <mc:Choice xmlns:p14="http://schemas.microsoft.com/office/powerpoint/2010/main" Requires="p14">
+  <mc:AlternateContent xmlns:mc="http://schemas.openxmlformats.org/markup-compatibility/2006" xmlns:p14="http://schemas.microsoft.com/office/powerpoint/2010/main">
+    <mc:Choice Requires="p14">
       <p:transition spd="med" p14:dur="700">
         <p:fade/>
       </p:transition>
     </mc:Choice>
-    <mc:Fallback>
+    <mc:Fallback xmlns="">
       <p:transition spd="med">
         <p:fade/>
       </p:transition>
@@ -12067,13 +12104,13 @@
   <p:clrMapOvr>
     <a:masterClrMapping/>
   </p:clrMapOvr>
-  <mc:AlternateContent xmlns:mc="http://schemas.openxmlformats.org/markup-compatibility/2006">
-    <mc:Choice xmlns:p14="http://schemas.microsoft.com/office/powerpoint/2010/main" Requires="p14">
+  <mc:AlternateContent xmlns:mc="http://schemas.openxmlformats.org/markup-compatibility/2006" xmlns:p14="http://schemas.microsoft.com/office/powerpoint/2010/main">
+    <mc:Choice Requires="p14">
       <p:transition spd="med" p14:dur="700">
         <p:fade/>
       </p:transition>
     </mc:Choice>
-    <mc:Fallback>
+    <mc:Fallback xmlns="">
       <p:transition spd="med">
         <p:fade/>
       </p:transition>
@@ -12254,13 +12291,13 @@
   <p:clrMapOvr>
     <a:masterClrMapping/>
   </p:clrMapOvr>
-  <mc:AlternateContent xmlns:mc="http://schemas.openxmlformats.org/markup-compatibility/2006">
-    <mc:Choice xmlns:p14="http://schemas.microsoft.com/office/powerpoint/2010/main" Requires="p14">
+  <mc:AlternateContent xmlns:mc="http://schemas.openxmlformats.org/markup-compatibility/2006" xmlns:p14="http://schemas.microsoft.com/office/powerpoint/2010/main">
+    <mc:Choice Requires="p14">
       <p:transition spd="med" p14:dur="700">
         <p:fade/>
       </p:transition>
     </mc:Choice>
-    <mc:Fallback>
+    <mc:Fallback xmlns="">
       <p:transition spd="med">
         <p:fade/>
       </p:transition>
@@ -12409,13 +12446,13 @@
   <p:clrMapOvr>
     <a:masterClrMapping/>
   </p:clrMapOvr>
-  <mc:AlternateContent xmlns:mc="http://schemas.openxmlformats.org/markup-compatibility/2006">
-    <mc:Choice xmlns:p14="http://schemas.microsoft.com/office/powerpoint/2010/main" Requires="p14">
+  <mc:AlternateContent xmlns:mc="http://schemas.openxmlformats.org/markup-compatibility/2006" xmlns:p14="http://schemas.microsoft.com/office/powerpoint/2010/main">
+    <mc:Choice Requires="p14">
       <p:transition spd="med" p14:dur="700">
         <p:fade/>
       </p:transition>
     </mc:Choice>
-    <mc:Fallback>
+    <mc:Fallback xmlns="">
       <p:transition spd="med">
         <p:fade/>
       </p:transition>
@@ -12629,13 +12666,13 @@
   <p:clrMapOvr>
     <a:masterClrMapping/>
   </p:clrMapOvr>
-  <mc:AlternateContent xmlns:mc="http://schemas.openxmlformats.org/markup-compatibility/2006">
-    <mc:Choice xmlns:p14="http://schemas.microsoft.com/office/powerpoint/2010/main" Requires="p14">
+  <mc:AlternateContent xmlns:mc="http://schemas.openxmlformats.org/markup-compatibility/2006" xmlns:p14="http://schemas.microsoft.com/office/powerpoint/2010/main">
+    <mc:Choice Requires="p14">
       <p:transition spd="med" p14:dur="700">
         <p:fade/>
       </p:transition>
     </mc:Choice>
-    <mc:Fallback>
+    <mc:Fallback xmlns="">
       <p:transition spd="med">
         <p:fade/>
       </p:transition>
@@ -12769,6 +12806,68 @@
           </a:p>
         </p:txBody>
       </p:sp>
+      <p:sp>
+        <p:nvSpPr>
+          <p:cNvPr id="4" name="TextBox 3">
+            <a:extLst>
+              <a:ext uri="{FF2B5EF4-FFF2-40B4-BE49-F238E27FC236}">
+                <a16:creationId xmlns:a16="http://schemas.microsoft.com/office/drawing/2014/main" id="{CE7C585B-07CD-A488-9F2E-F45821F4FBDC}"/>
+              </a:ext>
+            </a:extLst>
+          </p:cNvPr>
+          <p:cNvSpPr txBox="1"/>
+          <p:nvPr/>
+        </p:nvSpPr>
+        <p:spPr>
+          <a:xfrm>
+            <a:off x="2476707" y="5237825"/>
+            <a:ext cx="7238585" cy="369332"/>
+          </a:xfrm>
+          <a:prstGeom prst="rect">
+            <a:avLst/>
+          </a:prstGeom>
+          <a:noFill/>
+        </p:spPr>
+        <p:txBody>
+          <a:bodyPr wrap="none" rtlCol="0">
+            <a:spAutoFit/>
+          </a:bodyPr>
+          <a:lstStyle/>
+          <a:p>
+            <a:pPr algn="ctr"/>
+            <a:r>
+              <a:rPr lang="en-GB" dirty="0">
+                <a:solidFill>
+                  <a:schemeClr val="tx2"/>
+                </a:solidFill>
+              </a:rPr>
+              <a:t>Site link: </a:t>
+            </a:r>
+            <a:r>
+              <a:rPr lang="en-GB" dirty="0">
+                <a:solidFill>
+                  <a:schemeClr val="tx2"/>
+                </a:solidFill>
+                <a:latin typeface="Consolas" panose="020B0609020204030204" pitchFamily="49" charset="0"/>
+                <a:hlinkClick r:id="rId3">
+                  <a:extLst>
+                    <a:ext uri="{A12FA001-AC4F-418D-AE19-62706E023703}">
+                      <ahyp:hlinkClr xmlns:ahyp="http://schemas.microsoft.com/office/drawing/2018/hyperlinkcolor" val="tx"/>
+                    </a:ext>
+                  </a:extLst>
+                </a:hlinkClick>
+              </a:rPr>
+              <a:t>https://github.com/RepentForYourCyns/PythonML_GRC</a:t>
+            </a:r>
+            <a:endParaRPr lang="en-GB" dirty="0">
+              <a:solidFill>
+                <a:schemeClr val="tx2"/>
+              </a:solidFill>
+              <a:latin typeface="Consolas" panose="020B0609020204030204" pitchFamily="49" charset="0"/>
+            </a:endParaRPr>
+          </a:p>
+        </p:txBody>
+      </p:sp>
     </p:spTree>
     <p:extLst>
       <p:ext uri="{BB962C8B-B14F-4D97-AF65-F5344CB8AC3E}">
@@ -12779,13 +12878,13 @@
   <p:clrMapOvr>
     <a:masterClrMapping/>
   </p:clrMapOvr>
-  <mc:AlternateContent xmlns:mc="http://schemas.openxmlformats.org/markup-compatibility/2006">
-    <mc:Choice xmlns:p14="http://schemas.microsoft.com/office/powerpoint/2010/main" Requires="p14">
+  <mc:AlternateContent xmlns:mc="http://schemas.openxmlformats.org/markup-compatibility/2006" xmlns:p14="http://schemas.microsoft.com/office/powerpoint/2010/main">
+    <mc:Choice Requires="p14">
       <p:transition spd="med" p14:dur="700">
         <p:fade/>
       </p:transition>
     </mc:Choice>
-    <mc:Fallback>
+    <mc:Fallback xmlns="">
       <p:transition spd="med">
         <p:fade/>
       </p:transition>
@@ -13191,13 +13290,13 @@
   <p:clrMapOvr>
     <a:masterClrMapping/>
   </p:clrMapOvr>
-  <mc:AlternateContent xmlns:mc="http://schemas.openxmlformats.org/markup-compatibility/2006">
-    <mc:Choice xmlns:p14="http://schemas.microsoft.com/office/powerpoint/2010/main" Requires="p14">
+  <mc:AlternateContent xmlns:mc="http://schemas.openxmlformats.org/markup-compatibility/2006" xmlns:p14="http://schemas.microsoft.com/office/powerpoint/2010/main">
+    <mc:Choice Requires="p14">
       <p:transition spd="med" p14:dur="700">
         <p:fade/>
       </p:transition>
     </mc:Choice>
-    <mc:Fallback>
+    <mc:Fallback xmlns="">
       <p:transition spd="med">
         <p:fade/>
       </p:transition>
@@ -13737,13 +13836,13 @@
   <p:clrMapOvr>
     <a:masterClrMapping/>
   </p:clrMapOvr>
-  <mc:AlternateContent xmlns:mc="http://schemas.openxmlformats.org/markup-compatibility/2006">
-    <mc:Choice xmlns:p14="http://schemas.microsoft.com/office/powerpoint/2010/main" Requires="p14">
+  <mc:AlternateContent xmlns:mc="http://schemas.openxmlformats.org/markup-compatibility/2006" xmlns:p14="http://schemas.microsoft.com/office/powerpoint/2010/main">
+    <mc:Choice Requires="p14">
       <p:transition spd="med" p14:dur="700">
         <p:fade/>
       </p:transition>
     </mc:Choice>
-    <mc:Fallback>
+    <mc:Fallback xmlns="">
       <p:transition spd="med">
         <p:fade/>
       </p:transition>
@@ -13902,13 +14001,13 @@
   <p:clrMapOvr>
     <a:masterClrMapping/>
   </p:clrMapOvr>
-  <mc:AlternateContent xmlns:mc="http://schemas.openxmlformats.org/markup-compatibility/2006">
-    <mc:Choice xmlns:p14="http://schemas.microsoft.com/office/powerpoint/2010/main" Requires="p14">
+  <mc:AlternateContent xmlns:mc="http://schemas.openxmlformats.org/markup-compatibility/2006" xmlns:p14="http://schemas.microsoft.com/office/powerpoint/2010/main">
+    <mc:Choice Requires="p14">
       <p:transition spd="med" p14:dur="700">
         <p:fade/>
       </p:transition>
     </mc:Choice>
-    <mc:Fallback>
+    <mc:Fallback xmlns="">
       <p:transition spd="med">
         <p:fade/>
       </p:transition>
@@ -15480,13 +15579,13 @@
   <p:clrMapOvr>
     <a:masterClrMapping/>
   </p:clrMapOvr>
-  <mc:AlternateContent xmlns:mc="http://schemas.openxmlformats.org/markup-compatibility/2006">
-    <mc:Choice xmlns:p14="http://schemas.microsoft.com/office/powerpoint/2010/main" Requires="p14">
+  <mc:AlternateContent xmlns:mc="http://schemas.openxmlformats.org/markup-compatibility/2006" xmlns:p14="http://schemas.microsoft.com/office/powerpoint/2010/main">
+    <mc:Choice Requires="p14">
       <p:transition spd="med" p14:dur="700">
         <p:fade/>
       </p:transition>
     </mc:Choice>
-    <mc:Fallback>
+    <mc:Fallback xmlns="">
       <p:transition spd="med">
         <p:fade/>
       </p:transition>
@@ -15687,13 +15786,13 @@
   <p:clrMapOvr>
     <a:masterClrMapping/>
   </p:clrMapOvr>
-  <mc:AlternateContent xmlns:mc="http://schemas.openxmlformats.org/markup-compatibility/2006">
-    <mc:Choice xmlns:p14="http://schemas.microsoft.com/office/powerpoint/2010/main" Requires="p14">
+  <mc:AlternateContent xmlns:mc="http://schemas.openxmlformats.org/markup-compatibility/2006" xmlns:p14="http://schemas.microsoft.com/office/powerpoint/2010/main">
+    <mc:Choice Requires="p14">
       <p:transition spd="med" p14:dur="700">
         <p:fade/>
       </p:transition>
     </mc:Choice>
-    <mc:Fallback>
+    <mc:Fallback xmlns="">
       <p:transition spd="med">
         <p:fade/>
       </p:transition>
@@ -16688,13 +16787,13 @@
   <p:clrMapOvr>
     <a:masterClrMapping/>
   </p:clrMapOvr>
-  <mc:AlternateContent xmlns:mc="http://schemas.openxmlformats.org/markup-compatibility/2006">
-    <mc:Choice xmlns:p14="http://schemas.microsoft.com/office/powerpoint/2010/main" Requires="p14">
+  <mc:AlternateContent xmlns:mc="http://schemas.openxmlformats.org/markup-compatibility/2006" xmlns:p14="http://schemas.microsoft.com/office/powerpoint/2010/main">
+    <mc:Choice Requires="p14">
       <p:transition spd="med" p14:dur="700">
         <p:fade/>
       </p:transition>
     </mc:Choice>
-    <mc:Fallback>
+    <mc:Fallback xmlns="">
       <p:transition spd="med">
         <p:fade/>
       </p:transition>

</xml_diff>

<commit_message>
Add schedule to outline in slides
</commit_message>
<xml_diff>
--- a/Python and Machine Learning - Session 1.pptx
+++ b/Python and Machine Learning - Session 1.pptx
@@ -13,7 +13,7 @@
   <p:sldIdLst>
     <p:sldId id="311" r:id="rId2"/>
     <p:sldId id="312" r:id="rId3"/>
-    <p:sldId id="313" r:id="rId4"/>
+    <p:sldId id="259" r:id="rId4"/>
     <p:sldId id="314" r:id="rId5"/>
     <p:sldId id="315" r:id="rId6"/>
     <p:sldId id="316" r:id="rId7"/>
@@ -165,16 +165,46 @@
 </p:presentation>
 </file>
 
+<file path=ppt/authors.xml><?xml version="1.0" encoding="utf-8"?>
+<p188:authorLst xmlns:a="http://schemas.openxmlformats.org/drawingml/2006/main" xmlns:r="http://schemas.openxmlformats.org/officeDocument/2006/relationships" xmlns:p188="http://schemas.microsoft.com/office/powerpoint/2018/8/main">
+  <p188:author id="{43AB5EAA-6E4B-DB94-ABAF-A5F445BFF8E4}" name="Eleni Matechou" initials="EM" userId="S::em359@kent.ac.uk::5838976a-23f4-4a50-8ac6-be05de936b60" providerId="AD"/>
+</p188:authorLst>
+</file>
+
 <file path=ppt/revisionInfo.xml><?xml version="1.0" encoding="utf-8"?>
 <p1510:revInfo xmlns:a="http://schemas.openxmlformats.org/drawingml/2006/main" xmlns:r="http://schemas.openxmlformats.org/officeDocument/2006/relationships" xmlns:p1510="http://schemas.microsoft.com/office/powerpoint/2015/10/main">
   <p1510:revLst>
     <p1510:client id="{D371F446-BFBA-435D-AA5B-6E16AB7991C8}" v="1" dt="2025-03-17T19:39:47.016"/>
+    <p1510:client id="{DA1D0D38-9C7A-4721-B318-4FF8C293DCCA}" v="1" dt="2025-03-18T08:53:33.456"/>
   </p1510:revLst>
 </p1510:revInfo>
 </file>
 
 <file path=ppt/changesInfos/changesInfo1.xml><?xml version="1.0" encoding="utf-8"?>
 <pc:chgInfo xmlns:a="http://schemas.openxmlformats.org/drawingml/2006/main" xmlns:r="http://schemas.openxmlformats.org/officeDocument/2006/relationships" xmlns:ac="http://schemas.microsoft.com/office/drawing/2013/main/command" xmlns:pc="http://schemas.microsoft.com/office/powerpoint/2013/main/command">
+  <pc:docChgLst>
+    <pc:chgData name="Cosmo De Bonis-Campbell" userId="0e643c3f-1c6d-4563-b088-b166cc6858a2" providerId="ADAL" clId="{DA1D0D38-9C7A-4721-B318-4FF8C293DCCA}"/>
+    <pc:docChg chg="addSld delSld modSld">
+      <pc:chgData name="Cosmo De Bonis-Campbell" userId="0e643c3f-1c6d-4563-b088-b166cc6858a2" providerId="ADAL" clId="{DA1D0D38-9C7A-4721-B318-4FF8C293DCCA}" dt="2025-03-18T08:53:35.210" v="1" actId="47"/>
+      <pc:docMkLst>
+        <pc:docMk/>
+      </pc:docMkLst>
+      <pc:sldChg chg="add">
+        <pc:chgData name="Cosmo De Bonis-Campbell" userId="0e643c3f-1c6d-4563-b088-b166cc6858a2" providerId="ADAL" clId="{DA1D0D38-9C7A-4721-B318-4FF8C293DCCA}" dt="2025-03-18T08:53:33.451" v="0"/>
+        <pc:sldMkLst>
+          <pc:docMk/>
+          <pc:sldMk cId="997860157" sldId="259"/>
+        </pc:sldMkLst>
+      </pc:sldChg>
+      <pc:sldChg chg="del">
+        <pc:chgData name="Cosmo De Bonis-Campbell" userId="0e643c3f-1c6d-4563-b088-b166cc6858a2" providerId="ADAL" clId="{DA1D0D38-9C7A-4721-B318-4FF8C293DCCA}" dt="2025-03-18T08:53:35.210" v="1" actId="47"/>
+        <pc:sldMkLst>
+          <pc:docMk/>
+          <pc:sldMk cId="2592137955" sldId="313"/>
+        </pc:sldMkLst>
+      </pc:sldChg>
+    </pc:docChg>
+  </pc:docChgLst>
   <pc:docChgLst>
     <pc:chgData name="Cosmo De Bonis-Campbell" userId="0e643c3f-1c6d-4563-b088-b166cc6858a2" providerId="ADAL" clId="{D371F446-BFBA-435D-AA5B-6E16AB7991C8}"/>
     <pc:docChg chg="modSld">
@@ -202,6 +232,28 @@
 </pc:chgInfo>
 </file>
 
+<file path=ppt/comments/modernComment_103_3B7A233D.xml><?xml version="1.0" encoding="utf-8"?>
+<p188:cmLst xmlns:a="http://schemas.openxmlformats.org/drawingml/2006/main" xmlns:r="http://schemas.openxmlformats.org/officeDocument/2006/relationships" xmlns:p188="http://schemas.microsoft.com/office/powerpoint/2018/8/main">
+  <p188:cm id="{9AE75569-7D36-4AF4-B6F6-5F4A443E02B6}" authorId="{43AB5EAA-6E4B-DB94-ABAF-A5F445BFF8E4}" status="resolved" created="2025-03-10T11:51:54.753">
+    <ac:deMkLst xmlns:ac="http://schemas.microsoft.com/office/drawing/2013/main/command">
+      <pc:docMk xmlns:pc="http://schemas.microsoft.com/office/powerpoint/2013/main/command"/>
+      <pc:sldMk xmlns:pc="http://schemas.microsoft.com/office/powerpoint/2013/main/command" cId="997860157" sldId="259"/>
+      <ac:spMk id="3" creationId="{00000000-0000-0000-0000-000000000000}"/>
+    </ac:deMkLst>
+    <p188:txBody>
+      <a:bodyPr/>
+      <a:lstStyle/>
+      <a:p>
+        <a:r>
+          <a:rPr lang="en-GB"/>
+          <a:t>I would add date next to each lesson (and times preferably)</a:t>
+        </a:r>
+      </a:p>
+    </p188:txBody>
+  </p188:cm>
+</p188:cmLst>
+</file>
+
 <file path=ppt/handoutMasters/handoutMaster1.xml><?xml version="1.0" encoding="utf-8"?>
 <p:handoutMaster xmlns:a="http://schemas.openxmlformats.org/drawingml/2006/main" xmlns:r="http://schemas.openxmlformats.org/officeDocument/2006/relationships" xmlns:p="http://schemas.openxmlformats.org/presentationml/2006/main">
   <p:cSld>
@@ -286,7 +338,7 @@
             <a:pPr rtl="0"/>
             <a:fld id="{BE3387C1-8EFB-44F7-8485-D662F1CF7333}" type="datetime1">
               <a:rPr lang="en-GB" smtClean="0"/>
-              <a:t>17/03/2025</a:t>
+              <a:t>18/03/2025</a:t>
             </a:fld>
             <a:endParaRPr lang="en-GB" dirty="0"/>
           </a:p>
@@ -456,7 +508,7 @@
             <a:pPr rtl="0"/>
             <a:fld id="{88D6434E-09F1-48C0-A525-B5A7008B7802}" type="datetime1">
               <a:rPr lang="en-GB" noProof="0" smtClean="0"/>
-              <a:t>17/03/2025</a:t>
+              <a:t>18/03/2025</a:t>
             </a:fld>
             <a:endParaRPr lang="en-GB" noProof="0" dirty="0"/>
           </a:p>
@@ -1840,13 +1892,7 @@
   <p:cSld>
     <p:spTree>
       <p:nvGrpSpPr>
-        <p:cNvPr id="1" name="">
-          <a:extLst>
-            <a:ext uri="{FF2B5EF4-FFF2-40B4-BE49-F238E27FC236}">
-              <a16:creationId xmlns:a16="http://schemas.microsoft.com/office/drawing/2014/main" id="{54F2BF79-CCCE-C981-894F-FBD92D45EE2D}"/>
-            </a:ext>
-          </a:extLst>
-        </p:cNvPr>
+        <p:cNvPr id="1" name=""/>
         <p:cNvGrpSpPr/>
         <p:nvPr/>
       </p:nvGrpSpPr>
@@ -1860,13 +1906,7 @@
       </p:grpSpPr>
       <p:sp>
         <p:nvSpPr>
-          <p:cNvPr id="2" name="Slide Image Placeholder 1">
-            <a:extLst>
-              <a:ext uri="{FF2B5EF4-FFF2-40B4-BE49-F238E27FC236}">
-                <a16:creationId xmlns:a16="http://schemas.microsoft.com/office/drawing/2014/main" id="{65238559-8A17-86F4-DD41-B67349AC0E7A}"/>
-              </a:ext>
-            </a:extLst>
-          </p:cNvPr>
+          <p:cNvPr id="2" name="Slide Image Placeholder 1"/>
           <p:cNvSpPr>
             <a:spLocks noGrp="1" noRot="1" noChangeAspect="1"/>
           </p:cNvSpPr>
@@ -1878,13 +1918,7 @@
       </p:sp>
       <p:sp>
         <p:nvSpPr>
-          <p:cNvPr id="3" name="Notes Placeholder 2">
-            <a:extLst>
-              <a:ext uri="{FF2B5EF4-FFF2-40B4-BE49-F238E27FC236}">
-                <a16:creationId xmlns:a16="http://schemas.microsoft.com/office/drawing/2014/main" id="{DA422FEA-C50F-8F0B-6729-136D906E603F}"/>
-              </a:ext>
-            </a:extLst>
-          </p:cNvPr>
+          <p:cNvPr id="3" name="Notes Placeholder 2"/>
           <p:cNvSpPr>
             <a:spLocks noGrp="1"/>
           </p:cNvSpPr>
@@ -1911,13 +1945,7 @@
       </p:sp>
       <p:sp>
         <p:nvSpPr>
-          <p:cNvPr id="4" name="Slide Number Placeholder 3">
-            <a:extLst>
-              <a:ext uri="{FF2B5EF4-FFF2-40B4-BE49-F238E27FC236}">
-                <a16:creationId xmlns:a16="http://schemas.microsoft.com/office/drawing/2014/main" id="{D44A44AB-C356-C703-4F68-B2DF486BE84E}"/>
-              </a:ext>
-            </a:extLst>
-          </p:cNvPr>
+          <p:cNvPr id="4" name="Slide Number Placeholder 3"/>
           <p:cNvSpPr>
             <a:spLocks noGrp="1"/>
           </p:cNvSpPr>
@@ -1942,7 +1970,7 @@
     </p:spTree>
     <p:extLst>
       <p:ext uri="{BB962C8B-B14F-4D97-AF65-F5344CB8AC3E}">
-        <p14:creationId xmlns:p14="http://schemas.microsoft.com/office/powerpoint/2010/main" val="3241042262"/>
+        <p14:creationId xmlns:p14="http://schemas.microsoft.com/office/powerpoint/2010/main" val="955871110"/>
       </p:ext>
     </p:extLst>
   </p:cSld>
@@ -3367,7 +3395,7 @@
             <a:pPr rtl="0"/>
             <a:fld id="{B4AAD351-6347-4318-B935-1E0F1B6A61D6}" type="datetime1">
               <a:rPr lang="en-GB" noProof="0" smtClean="0"/>
-              <a:t>17/03/2025</a:t>
+              <a:t>18/03/2025</a:t>
             </a:fld>
             <a:endParaRPr lang="en-GB" noProof="0" dirty="0"/>
           </a:p>
@@ -3576,7 +3604,7 @@
             <a:pPr rtl="0"/>
             <a:fld id="{D2EB87B0-5071-4BC9-A19F-C3269318028C}" type="datetime1">
               <a:rPr lang="en-GB" noProof="0" smtClean="0"/>
-              <a:t>17/03/2025</a:t>
+              <a:t>18/03/2025</a:t>
             </a:fld>
             <a:endParaRPr lang="en-GB" noProof="0" dirty="0"/>
           </a:p>
@@ -3782,7 +3810,7 @@
             <a:pPr rtl="0"/>
             <a:fld id="{54B4CBB3-9133-42BF-BC20-6F6E1888C21F}" type="datetime1">
               <a:rPr lang="en-GB" noProof="0" smtClean="0"/>
-              <a:t>17/03/2025</a:t>
+              <a:t>18/03/2025</a:t>
             </a:fld>
             <a:endParaRPr lang="en-GB" noProof="0" dirty="0"/>
           </a:p>
@@ -3981,7 +4009,7 @@
             <a:pPr rtl="0"/>
             <a:fld id="{71F23539-3F81-4F1E-A9B7-5CE0C1986E23}" type="datetime1">
               <a:rPr lang="en-GB" noProof="0" smtClean="0"/>
-              <a:t>17/03/2025</a:t>
+              <a:t>18/03/2025</a:t>
             </a:fld>
             <a:endParaRPr lang="en-GB" noProof="0" dirty="0"/>
           </a:p>
@@ -4220,7 +4248,7 @@
             <a:pPr rtl="0"/>
             <a:fld id="{56854DA5-E4EE-42EA-9BC9-3160B1480769}" type="datetime1">
               <a:rPr lang="en-GB" noProof="0" smtClean="0"/>
-              <a:t>17/03/2025</a:t>
+              <a:t>18/03/2025</a:t>
             </a:fld>
             <a:endParaRPr lang="en-GB" noProof="0" dirty="0"/>
           </a:p>
@@ -4503,7 +4531,7 @@
             <a:pPr rtl="0"/>
             <a:fld id="{E9A1BF5D-7537-4BA8-9976-6302714DE26C}" type="datetime1">
               <a:rPr lang="en-GB" noProof="0" smtClean="0"/>
-              <a:t>17/03/2025</a:t>
+              <a:t>18/03/2025</a:t>
             </a:fld>
             <a:endParaRPr lang="en-GB" noProof="0" dirty="0"/>
           </a:p>
@@ -4949,7 +4977,7 @@
             <a:pPr rtl="0"/>
             <a:fld id="{8F8E4797-21F6-4D41-B035-97FEABB63BCE}" type="datetime1">
               <a:rPr lang="en-GB" noProof="0" smtClean="0"/>
-              <a:t>17/03/2025</a:t>
+              <a:t>18/03/2025</a:t>
             </a:fld>
             <a:endParaRPr lang="en-GB" noProof="0" dirty="0"/>
           </a:p>
@@ -5109,7 +5137,7 @@
             <a:pPr rtl="0"/>
             <a:fld id="{4EC45D07-A3FD-40EE-BB45-F5E3D0F2E1C8}" type="datetime1">
               <a:rPr lang="en-GB" noProof="0" smtClean="0"/>
-              <a:t>17/03/2025</a:t>
+              <a:t>18/03/2025</a:t>
             </a:fld>
             <a:endParaRPr lang="en-GB" noProof="0" dirty="0"/>
           </a:p>
@@ -5227,7 +5255,7 @@
             <a:pPr rtl="0"/>
             <a:fld id="{30FFDAF9-DFA9-4947-9568-03347A66D233}" type="datetime1">
               <a:rPr lang="en-GB" noProof="0" smtClean="0"/>
-              <a:t>17/03/2025</a:t>
+              <a:t>18/03/2025</a:t>
             </a:fld>
             <a:endParaRPr lang="en-GB" noProof="0" dirty="0"/>
           </a:p>
@@ -5495,7 +5523,7 @@
             <a:pPr rtl="0"/>
             <a:fld id="{D89D711C-098E-40E1-BE23-CFCA1FAB8359}" type="datetime1">
               <a:rPr lang="en-GB" noProof="0" smtClean="0"/>
-              <a:t>17/03/2025</a:t>
+              <a:t>18/03/2025</a:t>
             </a:fld>
             <a:endParaRPr lang="en-GB" noProof="0" dirty="0"/>
           </a:p>
@@ -5764,7 +5792,7 @@
             <a:pPr rtl="0"/>
             <a:fld id="{9A9A7A2F-7C81-4F05-8B4D-4983D3740BAF}" type="datetime1">
               <a:rPr lang="en-GB" noProof="0" smtClean="0"/>
-              <a:t>17/03/2025</a:t>
+              <a:t>18/03/2025</a:t>
             </a:fld>
             <a:endParaRPr lang="en-GB" noProof="0" dirty="0"/>
           </a:p>
@@ -6632,7 +6660,7 @@
             <a:pPr rtl="0"/>
             <a:fld id="{8B045440-74F0-4B44-BEF6-1040C3E911E1}" type="datetime1">
               <a:rPr lang="en-GB" noProof="0" smtClean="0"/>
-              <a:t>17/03/2025</a:t>
+              <a:t>18/03/2025</a:t>
             </a:fld>
             <a:endParaRPr lang="en-GB" noProof="0" dirty="0"/>
           </a:p>
@@ -12686,13 +12714,7 @@
   <p:cSld>
     <p:spTree>
       <p:nvGrpSpPr>
-        <p:cNvPr id="1" name="">
-          <a:extLst>
-            <a:ext uri="{FF2B5EF4-FFF2-40B4-BE49-F238E27FC236}">
-              <a16:creationId xmlns:a16="http://schemas.microsoft.com/office/drawing/2014/main" id="{634746EB-A487-5E7B-C77B-9F209017B2F0}"/>
-            </a:ext>
-          </a:extLst>
-        </p:cNvPr>
+        <p:cNvPr id="1" name=""/>
         <p:cNvGrpSpPr/>
         <p:nvPr/>
       </p:nvGrpSpPr>
@@ -12706,13 +12728,7 @@
       </p:grpSpPr>
       <p:sp>
         <p:nvSpPr>
-          <p:cNvPr id="2" name="Title 1">
-            <a:extLst>
-              <a:ext uri="{FF2B5EF4-FFF2-40B4-BE49-F238E27FC236}">
-                <a16:creationId xmlns:a16="http://schemas.microsoft.com/office/drawing/2014/main" id="{331ABA07-87E1-FB17-054B-FAFE495312CE}"/>
-              </a:ext>
-            </a:extLst>
-          </p:cNvPr>
+          <p:cNvPr id="2" name="Title 1"/>
           <p:cNvSpPr>
             <a:spLocks noGrp="1"/>
           </p:cNvSpPr>
@@ -12735,13 +12751,7 @@
       </p:sp>
       <p:sp>
         <p:nvSpPr>
-          <p:cNvPr id="3" name="Content Placeholder 2">
-            <a:extLst>
-              <a:ext uri="{FF2B5EF4-FFF2-40B4-BE49-F238E27FC236}">
-                <a16:creationId xmlns:a16="http://schemas.microsoft.com/office/drawing/2014/main" id="{5E4E0A7E-4DA9-32DF-E5C2-D034F98C51D6}"/>
-              </a:ext>
-            </a:extLst>
-          </p:cNvPr>
+          <p:cNvPr id="3" name="Content Placeholder 2"/>
           <p:cNvSpPr>
             <a:spLocks noGrp="1"/>
           </p:cNvSpPr>
@@ -12749,7 +12759,12 @@
             <p:ph idx="1"/>
           </p:nvPr>
         </p:nvSpPr>
-        <p:spPr/>
+        <p:spPr>
+          <a:xfrm>
+            <a:off x="609601" y="2249424"/>
+            <a:ext cx="7648280" cy="4325112"/>
+          </a:xfrm>
+        </p:spPr>
         <p:txBody>
           <a:bodyPr rtlCol="0"/>
           <a:lstStyle/>
@@ -12811,7 +12826,7 @@
           <p:cNvPr id="4" name="TextBox 3">
             <a:extLst>
               <a:ext uri="{FF2B5EF4-FFF2-40B4-BE49-F238E27FC236}">
-                <a16:creationId xmlns:a16="http://schemas.microsoft.com/office/drawing/2014/main" id="{CE7C585B-07CD-A488-9F2E-F45821F4FBDC}"/>
+                <a16:creationId xmlns:a16="http://schemas.microsoft.com/office/drawing/2014/main" id="{52CBDA03-8C99-6097-9894-753D888375A9}"/>
               </a:ext>
             </a:extLst>
           </p:cNvPr>
@@ -12820,7 +12835,7 @@
         </p:nvSpPr>
         <p:spPr>
           <a:xfrm>
-            <a:off x="2476707" y="5237825"/>
+            <a:off x="710754" y="5421318"/>
             <a:ext cx="7238585" cy="369332"/>
           </a:xfrm>
           <a:prstGeom prst="rect">
@@ -12849,7 +12864,7 @@
                   <a:schemeClr val="tx2"/>
                 </a:solidFill>
                 <a:latin typeface="Consolas" panose="020B0609020204030204" pitchFamily="49" charset="0"/>
-                <a:hlinkClick r:id="rId3">
+                <a:hlinkClick r:id="rId4">
                   <a:extLst>
                     <a:ext uri="{A12FA001-AC4F-418D-AE19-62706E023703}">
                       <ahyp:hlinkClr xmlns:ahyp="http://schemas.microsoft.com/office/drawing/2018/hyperlinkcolor" val="tx"/>
@@ -12868,10 +12883,333 @@
           </a:p>
         </p:txBody>
       </p:sp>
+      <p:sp>
+        <p:nvSpPr>
+          <p:cNvPr id="5" name="Content Placeholder 2">
+            <a:extLst>
+              <a:ext uri="{FF2B5EF4-FFF2-40B4-BE49-F238E27FC236}">
+                <a16:creationId xmlns:a16="http://schemas.microsoft.com/office/drawing/2014/main" id="{5BC69B2F-D51B-9E2B-BF55-E91B97993C24}"/>
+              </a:ext>
+            </a:extLst>
+          </p:cNvPr>
+          <p:cNvSpPr txBox="1">
+            <a:spLocks/>
+          </p:cNvSpPr>
+          <p:nvPr/>
+        </p:nvSpPr>
+        <p:spPr>
+          <a:xfrm>
+            <a:off x="8050491" y="2249424"/>
+            <a:ext cx="3450210" cy="3541226"/>
+          </a:xfrm>
+          <a:prstGeom prst="rect">
+            <a:avLst/>
+          </a:prstGeom>
+        </p:spPr>
+        <p:txBody>
+          <a:bodyPr vert="horz" rtlCol="0">
+            <a:normAutofit/>
+          </a:bodyPr>
+          <a:lstStyle>
+            <a:lvl1pPr marL="365760" indent="-256032" algn="l" rtl="0" eaLnBrk="1" latinLnBrk="0" hangingPunct="1">
+              <a:spcBef>
+                <a:spcPts val="300"/>
+              </a:spcBef>
+              <a:buClr>
+                <a:schemeClr val="accent3">
+                  <a:lumMod val="75000"/>
+                </a:schemeClr>
+              </a:buClr>
+              <a:buFont typeface="Georgia"/>
+              <a:buChar char="•"/>
+              <a:defRPr kumimoji="0" sz="2800" kern="1200">
+                <a:solidFill>
+                  <a:schemeClr val="tx2"/>
+                </a:solidFill>
+                <a:latin typeface="+mn-lt"/>
+                <a:ea typeface="+mn-ea"/>
+                <a:cs typeface="+mn-cs"/>
+              </a:defRPr>
+            </a:lvl1pPr>
+            <a:lvl2pPr marL="658368" indent="-246888" algn="l" rtl="0" eaLnBrk="1" latinLnBrk="0" hangingPunct="1">
+              <a:spcBef>
+                <a:spcPts val="300"/>
+              </a:spcBef>
+              <a:buClr>
+                <a:schemeClr val="accent2">
+                  <a:lumMod val="75000"/>
+                </a:schemeClr>
+              </a:buClr>
+              <a:buFont typeface="Georgia"/>
+              <a:buChar char="▫"/>
+              <a:defRPr kumimoji="0" sz="2600" kern="1200">
+                <a:solidFill>
+                  <a:schemeClr val="tx2"/>
+                </a:solidFill>
+                <a:latin typeface="+mn-lt"/>
+                <a:ea typeface="+mn-ea"/>
+                <a:cs typeface="+mn-cs"/>
+              </a:defRPr>
+            </a:lvl2pPr>
+            <a:lvl3pPr marL="923544" indent="-219456" algn="l" rtl="0" eaLnBrk="1" latinLnBrk="0" hangingPunct="1">
+              <a:spcBef>
+                <a:spcPts val="300"/>
+              </a:spcBef>
+              <a:buClr>
+                <a:schemeClr val="accent1">
+                  <a:lumMod val="50000"/>
+                </a:schemeClr>
+              </a:buClr>
+              <a:buFont typeface="Wingdings 2" panose="05020102010507070707" pitchFamily="18" charset="2"/>
+              <a:buChar char=""/>
+              <a:defRPr kumimoji="0" sz="2400" kern="1200">
+                <a:solidFill>
+                  <a:schemeClr val="tx2"/>
+                </a:solidFill>
+                <a:latin typeface="+mn-lt"/>
+                <a:ea typeface="+mn-ea"/>
+                <a:cs typeface="+mn-cs"/>
+              </a:defRPr>
+            </a:lvl3pPr>
+            <a:lvl4pPr marL="1179576" indent="-201168" algn="l" rtl="0" eaLnBrk="1" latinLnBrk="0" hangingPunct="1">
+              <a:spcBef>
+                <a:spcPts val="300"/>
+              </a:spcBef>
+              <a:buClr>
+                <a:schemeClr val="accent1">
+                  <a:lumMod val="50000"/>
+                </a:schemeClr>
+              </a:buClr>
+              <a:buFont typeface="Wingdings 2" panose="05020102010507070707" pitchFamily="18" charset="2"/>
+              <a:buChar char=""/>
+              <a:defRPr kumimoji="0" sz="2200" kern="1200">
+                <a:solidFill>
+                  <a:schemeClr val="tx2"/>
+                </a:solidFill>
+                <a:latin typeface="+mn-lt"/>
+                <a:ea typeface="+mn-ea"/>
+                <a:cs typeface="+mn-cs"/>
+              </a:defRPr>
+            </a:lvl4pPr>
+            <a:lvl5pPr marL="1389888" indent="-182880" algn="l" rtl="0" eaLnBrk="1" latinLnBrk="0" hangingPunct="1">
+              <a:spcBef>
+                <a:spcPts val="300"/>
+              </a:spcBef>
+              <a:buClr>
+                <a:schemeClr val="accent1">
+                  <a:lumMod val="50000"/>
+                </a:schemeClr>
+              </a:buClr>
+              <a:buFont typeface="Wingdings 2" panose="05020102010507070707" pitchFamily="18" charset="2"/>
+              <a:buChar char=""/>
+              <a:defRPr kumimoji="0" sz="2000" kern="1200">
+                <a:solidFill>
+                  <a:schemeClr val="tx2"/>
+                </a:solidFill>
+                <a:latin typeface="+mn-lt"/>
+                <a:ea typeface="+mn-ea"/>
+                <a:cs typeface="+mn-cs"/>
+              </a:defRPr>
+            </a:lvl5pPr>
+            <a:lvl6pPr marL="1609344" indent="-182880" algn="l" rtl="0" eaLnBrk="1" latinLnBrk="0" hangingPunct="1">
+              <a:spcBef>
+                <a:spcPts val="300"/>
+              </a:spcBef>
+              <a:buClr>
+                <a:schemeClr val="accent1">
+                  <a:lumMod val="50000"/>
+                </a:schemeClr>
+              </a:buClr>
+              <a:buFont typeface="Wingdings 2" panose="05020102010507070707" pitchFamily="18" charset="2"/>
+              <a:buChar char=""/>
+              <a:defRPr kumimoji="0" sz="1800" kern="1200">
+                <a:solidFill>
+                  <a:schemeClr val="tx2"/>
+                </a:solidFill>
+                <a:latin typeface="+mn-lt"/>
+                <a:ea typeface="+mn-ea"/>
+                <a:cs typeface="+mn-cs"/>
+              </a:defRPr>
+            </a:lvl6pPr>
+            <a:lvl7pPr marL="1828800" indent="-182880" algn="l" rtl="0" eaLnBrk="1" latinLnBrk="0" hangingPunct="1">
+              <a:spcBef>
+                <a:spcPts val="300"/>
+              </a:spcBef>
+              <a:buClr>
+                <a:schemeClr val="accent1">
+                  <a:lumMod val="50000"/>
+                </a:schemeClr>
+              </a:buClr>
+              <a:buFont typeface="Wingdings 2" panose="05020102010507070707" pitchFamily="18" charset="2"/>
+              <a:buChar char=""/>
+              <a:defRPr kumimoji="0" sz="1600" kern="1200">
+                <a:solidFill>
+                  <a:schemeClr val="tx2"/>
+                </a:solidFill>
+                <a:latin typeface="+mn-lt"/>
+                <a:ea typeface="+mn-ea"/>
+                <a:cs typeface="+mn-cs"/>
+              </a:defRPr>
+            </a:lvl7pPr>
+            <a:lvl8pPr marL="2029968" indent="-182880" algn="l" rtl="0" eaLnBrk="1" latinLnBrk="0" hangingPunct="1">
+              <a:spcBef>
+                <a:spcPts val="300"/>
+              </a:spcBef>
+              <a:buClr>
+                <a:schemeClr val="accent1">
+                  <a:lumMod val="50000"/>
+                </a:schemeClr>
+              </a:buClr>
+              <a:buFont typeface="Wingdings 2" panose="05020102010507070707" pitchFamily="18" charset="2"/>
+              <a:buChar char=""/>
+              <a:defRPr kumimoji="0" sz="1500" kern="1200">
+                <a:solidFill>
+                  <a:schemeClr val="tx2"/>
+                </a:solidFill>
+                <a:latin typeface="+mn-lt"/>
+                <a:ea typeface="+mn-ea"/>
+                <a:cs typeface="+mn-cs"/>
+              </a:defRPr>
+            </a:lvl8pPr>
+            <a:lvl9pPr marL="2240280" indent="-182880" algn="l" rtl="0" eaLnBrk="1" latinLnBrk="0" hangingPunct="1">
+              <a:spcBef>
+                <a:spcPts val="300"/>
+              </a:spcBef>
+              <a:buClr>
+                <a:schemeClr val="accent1">
+                  <a:lumMod val="50000"/>
+                </a:schemeClr>
+              </a:buClr>
+              <a:buFont typeface="Wingdings 2" panose="05020102010507070707" pitchFamily="18" charset="2"/>
+              <a:buChar char=""/>
+              <a:defRPr kumimoji="0" sz="1400" kern="1200" baseline="0">
+                <a:solidFill>
+                  <a:schemeClr val="tx2"/>
+                </a:solidFill>
+                <a:latin typeface="+mn-lt"/>
+                <a:ea typeface="+mn-ea"/>
+                <a:cs typeface="+mn-cs"/>
+              </a:defRPr>
+            </a:lvl9pPr>
+          </a:lstStyle>
+          <a:p>
+            <a:pPr marL="109728" indent="0">
+              <a:buNone/>
+            </a:pPr>
+            <a:r>
+              <a:rPr lang="en-GB" sz="2000" u="sng" dirty="0"/>
+              <a:t>Schedule</a:t>
+            </a:r>
+            <a:r>
+              <a:rPr lang="en-GB" sz="2000" dirty="0"/>
+              <a:t> (both days)</a:t>
+            </a:r>
+          </a:p>
+          <a:p>
+            <a:pPr marL="109728" indent="0">
+              <a:buNone/>
+            </a:pPr>
+            <a:endParaRPr lang="en-GB" sz="2000" dirty="0"/>
+          </a:p>
+          <a:p>
+            <a:pPr marL="109728" indent="0">
+              <a:buNone/>
+            </a:pPr>
+            <a:r>
+              <a:rPr lang="en-GB" sz="2000" dirty="0"/>
+              <a:t>10:00-11:00 – </a:t>
+            </a:r>
+            <a:r>
+              <a:rPr lang="en-GB" sz="2000" i="1" dirty="0"/>
+              <a:t>Teaching</a:t>
+            </a:r>
+          </a:p>
+          <a:p>
+            <a:pPr marL="109728" indent="0">
+              <a:buNone/>
+            </a:pPr>
+            <a:r>
+              <a:rPr lang="en-GB" sz="2000" dirty="0"/>
+              <a:t>11:00-11:25 – </a:t>
+            </a:r>
+            <a:r>
+              <a:rPr lang="en-GB" sz="2000" i="1" dirty="0"/>
+              <a:t>Break</a:t>
+            </a:r>
+          </a:p>
+          <a:p>
+            <a:pPr marL="109728" indent="0">
+              <a:buNone/>
+            </a:pPr>
+            <a:r>
+              <a:rPr lang="en-GB" sz="2000" dirty="0"/>
+              <a:t>11:30-12:30 – </a:t>
+            </a:r>
+            <a:r>
+              <a:rPr lang="en-GB" sz="2000" i="1" dirty="0"/>
+              <a:t>Teaching</a:t>
+            </a:r>
+            <a:endParaRPr lang="en-GB" sz="2000" dirty="0"/>
+          </a:p>
+          <a:p>
+            <a:pPr marL="109728" indent="0">
+              <a:buNone/>
+            </a:pPr>
+            <a:r>
+              <a:rPr lang="en-GB" sz="2000" dirty="0"/>
+              <a:t>12:30-13:25 – </a:t>
+            </a:r>
+            <a:r>
+              <a:rPr lang="en-GB" sz="2000" i="1" dirty="0"/>
+              <a:t>Break</a:t>
+            </a:r>
+          </a:p>
+          <a:p>
+            <a:pPr marL="109728" indent="0">
+              <a:buNone/>
+            </a:pPr>
+            <a:r>
+              <a:rPr lang="en-GB" sz="2000" dirty="0"/>
+              <a:t>13:30-14:30 – </a:t>
+            </a:r>
+            <a:r>
+              <a:rPr lang="en-GB" sz="2000" i="1" dirty="0"/>
+              <a:t>Teaching</a:t>
+            </a:r>
+          </a:p>
+          <a:p>
+            <a:pPr marL="109728" indent="0">
+              <a:buNone/>
+            </a:pPr>
+            <a:r>
+              <a:rPr lang="en-GB" sz="2000" dirty="0"/>
+              <a:t>14:30-14:55 – </a:t>
+            </a:r>
+            <a:r>
+              <a:rPr lang="en-GB" sz="2000" i="1" dirty="0"/>
+              <a:t>Break</a:t>
+            </a:r>
+          </a:p>
+          <a:p>
+            <a:pPr marL="109728" indent="0">
+              <a:buNone/>
+            </a:pPr>
+            <a:r>
+              <a:rPr lang="en-GB" sz="2000" dirty="0"/>
+              <a:t>15:00-16:00 - </a:t>
+            </a:r>
+            <a:r>
+              <a:rPr lang="en-GB" sz="2000" i="1" dirty="0"/>
+              <a:t>Teaching</a:t>
+            </a:r>
+            <a:endParaRPr lang="en-GB" sz="2000" dirty="0"/>
+          </a:p>
+        </p:txBody>
+      </p:sp>
     </p:spTree>
     <p:extLst>
       <p:ext uri="{BB962C8B-B14F-4D97-AF65-F5344CB8AC3E}">
-        <p14:creationId xmlns:p14="http://schemas.microsoft.com/office/powerpoint/2010/main" val="2592137955"/>
+        <p14:creationId xmlns:p14="http://schemas.microsoft.com/office/powerpoint/2010/main" val="997860157"/>
       </p:ext>
     </p:extLst>
   </p:cSld>
@@ -12890,6 +13228,11 @@
       </p:transition>
     </mc:Fallback>
   </mc:AlternateContent>
+  <p:extLst>
+    <p:ext uri="{6950BFC3-D8DA-4A85-94F7-54DA5524770B}">
+      <p188:commentRel xmlns:p188="http://schemas.microsoft.com/office/powerpoint/2018/8/main" r:id="rId3"/>
+    </p:ext>
+  </p:extLst>
 </p:sld>
 </file>
 

</xml_diff>